<commit_message>
docs: update deep learning
</commit_message>
<xml_diff>
--- a/laboratory/pnuskgh/docs/Deep_Learning.pptx
+++ b/laboratory/pnuskgh/docs/Deep_Learning.pptx
@@ -7700,7 +7700,7 @@
         <p:spPr>
           <a:xfrm>
             <a:off x="344488" y="1412776"/>
-            <a:ext cx="6624637" cy="3699474"/>
+            <a:ext cx="6624637" cy="5213735"/>
           </a:xfrm>
           <a:prstGeom prst="rect">
             <a:avLst/>
@@ -7911,6 +7911,83 @@
             </a:endParaRPr>
           </a:p>
           <a:p>
+            <a:pPr lvl="1"/>
+            <a:r>
+              <a:rPr lang="en-US" altLang="ko-KR" sz="1400" dirty="0">
+                <a:latin typeface="+mn-ea"/>
+              </a:rPr>
+              <a:t>y</a:t>
+            </a:r>
+            <a:r>
+              <a:rPr lang="ko-KR" altLang="en-US" sz="1400" dirty="0">
+                <a:latin typeface="+mn-ea"/>
+              </a:rPr>
+              <a:t>로 </a:t>
+            </a:r>
+            <a:r>
+              <a:rPr lang="en-US" altLang="ko-KR" sz="1400" dirty="0">
+                <a:latin typeface="+mn-ea"/>
+              </a:rPr>
+              <a:t>x</a:t>
+            </a:r>
+            <a:r>
+              <a:rPr lang="ko-KR" altLang="en-US" sz="1400" dirty="0">
+                <a:latin typeface="+mn-ea"/>
+              </a:rPr>
+              <a:t>를 생성</a:t>
+            </a:r>
+            <a:endParaRPr lang="en-US" altLang="ko-KR" sz="1400" dirty="0">
+              <a:latin typeface="+mn-ea"/>
+            </a:endParaRPr>
+          </a:p>
+          <a:p>
+            <a:pPr lvl="2"/>
+            <a:r>
+              <a:rPr lang="en-US" altLang="ko-KR" sz="1400" dirty="0" err="1">
+                <a:latin typeface="+mn-ea"/>
+              </a:rPr>
+              <a:t>AutoEncoders</a:t>
+            </a:r>
+          </a:p>
+          <a:p>
+            <a:pPr lvl="2"/>
+            <a:r>
+              <a:rPr lang="ko-KR" altLang="en-US" sz="1400" dirty="0" err="1">
+                <a:latin typeface="+mn-ea"/>
+              </a:rPr>
+              <a:t>인코더  </a:t>
+            </a:r>
+            <a:r>
+              <a:rPr lang="en-US" altLang="ko-KR" sz="1400" dirty="0" err="1">
+                <a:latin typeface="+mn-ea"/>
+                <a:sym typeface="Wingdings" pitchFamily="2" charset="2"/>
+              </a:rPr>
+              <a:t></a:t>
+            </a:r>
+            <a:r>
+              <a:rPr lang="ko-KR" altLang="en-US" sz="1400" dirty="0" err="1">
+                <a:latin typeface="+mn-ea"/>
+                <a:sym typeface="Wingdings" pitchFamily="2" charset="2"/>
+              </a:rPr>
+              <a:t>  </a:t>
+            </a:r>
+            <a:r>
+              <a:rPr lang="ko-KR" altLang="en-US" sz="1400" b="1" dirty="0" err="1">
+                <a:solidFill>
+                  <a:srgbClr val="0070C0"/>
+                </a:solidFill>
+                <a:latin typeface="+mn-ea"/>
+                <a:sym typeface="Wingdings" pitchFamily="2" charset="2"/>
+              </a:rPr>
+              <a:t>디코더</a:t>
+            </a:r>
+            <a:r>
+              <a:rPr lang="en-US" altLang="ko-KR" sz="1400" dirty="0" err="1">
+                <a:latin typeface="+mn-ea"/>
+                <a:sym typeface="Wingdings" pitchFamily="2" charset="2"/>
+              </a:rPr>
+              <a:t> (New)</a:t>
+            </a:r>
             <a:endParaRPr lang="en-US" altLang="ko-KR" sz="1600" dirty="0">
               <a:latin typeface="+mn-ea"/>
             </a:endParaRPr>
@@ -7949,6 +8026,33 @@
               <a:rPr lang="ko-KR" altLang="en-US" sz="1400" dirty="0">
                 <a:latin typeface="+mn-ea"/>
               </a:rPr>
+              <a:t>의 일부를 재활용</a:t>
+            </a:r>
+            <a:r>
+              <a:rPr lang="en-US" altLang="ko-KR" sz="1400" dirty="0">
+                <a:latin typeface="+mn-ea"/>
+              </a:rPr>
+              <a:t>		:</a:t>
+            </a:r>
+          </a:p>
+          <a:p>
+            <a:pPr lvl="1"/>
+            <a:endParaRPr lang="en-US" altLang="ko-KR" sz="1400" dirty="0">
+              <a:latin typeface="+mn-ea"/>
+            </a:endParaRPr>
+          </a:p>
+          <a:p>
+            <a:pPr lvl="1"/>
+            <a:r>
+              <a:rPr lang="en-US" altLang="ko-KR" sz="1400" dirty="0">
+                <a:latin typeface="+mn-ea"/>
+              </a:rPr>
+              <a:t>Application</a:t>
+            </a:r>
+            <a:r>
+              <a:rPr lang="ko-KR" altLang="en-US" sz="1400" dirty="0">
+                <a:latin typeface="+mn-ea"/>
+              </a:rPr>
               <a:t>을 </a:t>
             </a:r>
             <a:r>
@@ -7994,19 +8098,93 @@
               <a:rPr lang="ko-KR" altLang="en-US" sz="1400" dirty="0">
                 <a:latin typeface="+mn-ea"/>
               </a:rPr>
-              <a:t>의 일부를 재활용</a:t>
+              <a:t>으로 </a:t>
             </a:r>
             <a:r>
               <a:rPr lang="en-US" altLang="ko-KR" sz="1400" dirty="0">
                 <a:latin typeface="+mn-ea"/>
               </a:rPr>
-              <a:t>		:</a:t>
+              <a:t>x</a:t>
             </a:r>
             <a:r>
               <a:rPr lang="ko-KR" altLang="en-US" sz="1400" dirty="0">
                 <a:latin typeface="+mn-ea"/>
               </a:rPr>
+              <a:t>를 생성</a:t>
+            </a:r>
+            <a:endParaRPr lang="en-US" altLang="ko-KR" sz="1400" dirty="0">
+              <a:latin typeface="+mn-ea"/>
+            </a:endParaRPr>
+          </a:p>
+          <a:p>
+            <a:pPr lvl="2"/>
+            <a:r>
+              <a:rPr lang="en-US" altLang="ko-KR" sz="1400" dirty="0">
+                <a:latin typeface="+mn-ea"/>
+              </a:rPr>
+              <a:t>GAN (Generative Adversarial Networks, </a:t>
+            </a:r>
+            <a:r>
+              <a:rPr lang="ko-KR" altLang="en-US" sz="1400" dirty="0" err="1">
+                <a:latin typeface="+mn-ea"/>
+              </a:rPr>
+              <a:t>생성적</a:t>
+            </a:r>
+            <a:r>
+              <a:rPr lang="ko-KR" altLang="en-US" sz="1400" dirty="0">
+                <a:latin typeface="+mn-ea"/>
+              </a:rPr>
+              <a:t> 적대 신경망</a:t>
+            </a:r>
+            <a:r>
+              <a:rPr lang="en-US" altLang="ko-KR" sz="1400" dirty="0">
+                <a:latin typeface="+mn-ea"/>
+              </a:rPr>
+              <a:t>)</a:t>
+            </a:r>
+          </a:p>
+          <a:p>
+            <a:pPr lvl="2"/>
+            <a:r>
+              <a:rPr lang="ko-KR" altLang="en-US" sz="1400" b="1" dirty="0">
+                <a:solidFill>
+                  <a:srgbClr val="0070C0"/>
+                </a:solidFill>
+                <a:latin typeface="+mn-ea"/>
+              </a:rPr>
+              <a:t>생성기</a:t>
+            </a:r>
+            <a:r>
+              <a:rPr lang="ko-KR" altLang="en-US" sz="1400" dirty="0">
+                <a:latin typeface="+mn-ea"/>
+              </a:rPr>
               <a:t> </a:t>
+            </a:r>
+            <a:r>
+              <a:rPr lang="en-US" altLang="ko-KR" sz="1400" dirty="0">
+                <a:latin typeface="+mn-ea"/>
+              </a:rPr>
+              <a:t>(New)</a:t>
+            </a:r>
+            <a:r>
+              <a:rPr lang="ko-KR" altLang="en-US" sz="1400" dirty="0">
+                <a:latin typeface="+mn-ea"/>
+              </a:rPr>
+              <a:t>  </a:t>
+            </a:r>
+            <a:r>
+              <a:rPr lang="en-US" altLang="ko-KR" sz="1400" dirty="0">
+                <a:latin typeface="+mn-ea"/>
+                <a:sym typeface="Wingdings" pitchFamily="2" charset="2"/>
+              </a:rPr>
+              <a:t></a:t>
+            </a:r>
+            <a:r>
+              <a:rPr lang="ko-KR" altLang="en-US" sz="1400" dirty="0">
+                <a:latin typeface="+mn-ea"/>
+                <a:sym typeface="Wingdings" pitchFamily="2" charset="2"/>
+              </a:rPr>
+              <a:t>  판별기</a:t>
             </a:r>
             <a:endParaRPr lang="en-US" altLang="ko-KR" sz="1400" dirty="0">
               <a:latin typeface="+mn-ea"/>
@@ -23998,7 +24176,7 @@
         </p:blipFill>
         <p:spPr>
           <a:xfrm>
-            <a:off x="798955" y="4865073"/>
+            <a:off x="798955" y="5153105"/>
             <a:ext cx="1489749" cy="1126018"/>
           </a:xfrm>
           <a:prstGeom prst="rect">
@@ -24034,7 +24212,7 @@
         </p:blipFill>
         <p:spPr>
           <a:xfrm>
-            <a:off x="3493078" y="4865073"/>
+            <a:off x="3493078" y="5153105"/>
             <a:ext cx="1489749" cy="1126018"/>
           </a:xfrm>
           <a:prstGeom prst="rect">
@@ -24058,7 +24236,7 @@
         </p:nvSpPr>
         <p:spPr>
           <a:xfrm>
-            <a:off x="1127632" y="5991091"/>
+            <a:off x="1127632" y="6279123"/>
             <a:ext cx="832394" cy="246221"/>
           </a:xfrm>
           <a:prstGeom prst="rect">
@@ -24239,7 +24417,7 @@
         </p:nvSpPr>
         <p:spPr>
           <a:xfrm>
-            <a:off x="3821755" y="5991091"/>
+            <a:off x="3821755" y="6279123"/>
             <a:ext cx="832394" cy="246221"/>
           </a:xfrm>
           <a:prstGeom prst="rect">
@@ -24418,7 +24596,7 @@
         </p:nvSpPr>
         <p:spPr>
           <a:xfrm>
-            <a:off x="2561054" y="5176140"/>
+            <a:off x="2561054" y="5464172"/>
             <a:ext cx="648072" cy="504056"/>
           </a:xfrm>
           <a:prstGeom prst="stripedRightArrow">
@@ -25285,7 +25463,7 @@
               <a:rPr lang="en-US" altLang="ko-KR" sz="2400" dirty="0" err="1">
                 <a:latin typeface="+mn-ea"/>
               </a:rPr>
-              <a:t>AutoEncoders</a:t>
+              <a:t>AutoEncoder</a:t>
             </a:r>
             <a:endParaRPr lang="ko-KR" altLang="en-US" sz="2400" dirty="0"/>
           </a:p>
@@ -25318,7 +25496,7 @@
               <a:rPr lang="en-US" altLang="ko-KR" sz="1600" dirty="0" err="1">
                 <a:latin typeface="+mn-ea"/>
               </a:rPr>
-              <a:t>AutoEncoders</a:t>
+              <a:t>AutoEncoder</a:t>
             </a:r>
             <a:endParaRPr lang="en-US" altLang="ko-KR" sz="1600" dirty="0">
               <a:latin typeface="+mn-ea"/>
@@ -25762,7 +25940,7 @@
         </p:blipFill>
         <p:spPr>
           <a:xfrm>
-            <a:off x="798955" y="5048012"/>
+            <a:off x="798955" y="5112455"/>
             <a:ext cx="1489749" cy="1126018"/>
           </a:xfrm>
           <a:prstGeom prst="rect">
@@ -25798,7 +25976,7 @@
         </p:blipFill>
         <p:spPr>
           <a:xfrm>
-            <a:off x="3493078" y="5048012"/>
+            <a:off x="3493078" y="5112455"/>
             <a:ext cx="1489749" cy="1126018"/>
           </a:xfrm>
           <a:prstGeom prst="rect">
@@ -25822,7 +26000,7 @@
         </p:nvSpPr>
         <p:spPr>
           <a:xfrm>
-            <a:off x="798955" y="6174030"/>
+            <a:off x="798955" y="6238473"/>
             <a:ext cx="1489749" cy="430887"/>
           </a:xfrm>
           <a:prstGeom prst="rect">
@@ -26030,7 +26208,7 @@
         </p:nvSpPr>
         <p:spPr>
           <a:xfrm>
-            <a:off x="3584848" y="6174030"/>
+            <a:off x="3584848" y="6238473"/>
             <a:ext cx="1397979" cy="430887"/>
           </a:xfrm>
           <a:prstGeom prst="rect">
@@ -26236,7 +26414,7 @@
         </p:nvSpPr>
         <p:spPr>
           <a:xfrm>
-            <a:off x="2561054" y="5359079"/>
+            <a:off x="2561054" y="5423522"/>
             <a:ext cx="648072" cy="504056"/>
           </a:xfrm>
           <a:prstGeom prst="stripedRightArrow">
@@ -28437,8 +28615,8 @@
           </a:p>
         </p:txBody>
       </p:sp>
-      <mc:AlternateContent xmlns:mc="http://schemas.openxmlformats.org/markup-compatibility/2006">
-        <mc:Choice xmlns:a14="http://schemas.microsoft.com/office/drawing/2010/main" Requires="a14">
+      <mc:AlternateContent xmlns:mc="http://schemas.openxmlformats.org/markup-compatibility/2006" xmlns:a14="http://schemas.microsoft.com/office/drawing/2010/main">
+        <mc:Choice Requires="a14">
           <p:sp>
             <p:nvSpPr>
               <p:cNvPr id="2" name="내용 개체 틀 4">
@@ -28990,7 +29168,7 @@
             </p:txBody>
           </p:sp>
         </mc:Choice>
-        <mc:Fallback>
+        <mc:Fallback xmlns="">
           <p:sp>
             <p:nvSpPr>
               <p:cNvPr id="2" name="내용 개체 틀 4">

</xml_diff>